<commit_message>
Demo - Comments only
</commit_message>
<xml_diff>
--- a/AZSevai.pptx
+++ b/AZSevai.pptx
@@ -2567,7 +2567,7 @@
             <a:fld id="{3BBED7E8-0829-F34C-B479-A757805E6C1B}" type="datetimeFigureOut">
               <a:rPr lang="en-US" smtClean="0"/>
               <a:pPr/>
-              <a:t>9/29/2019</a:t>
+              <a:t>10/1/2019</a:t>
             </a:fld>
             <a:endParaRPr lang="en-US"/>
           </a:p>
@@ -3052,7 +3052,7 @@
             <a:fld id="{6C7E4F11-7667-5045-A00B-01970EA44BB5}" type="datetimeFigureOut">
               <a:rPr lang="en-US" smtClean="0"/>
               <a:pPr/>
-              <a:t>9/29/2019</a:t>
+              <a:t>10/1/2019</a:t>
             </a:fld>
             <a:endParaRPr lang="en-US"/>
           </a:p>
@@ -23009,7 +23009,12 @@
             <p:ph type="title"/>
           </p:nvPr>
         </p:nvSpPr>
-        <p:spPr/>
+        <p:spPr>
+          <a:xfrm>
+            <a:off x="100705" y="227082"/>
+            <a:ext cx="8765651" cy="310500"/>
+          </a:xfrm>
+        </p:spPr>
         <p:txBody>
           <a:bodyPr/>
           <a:lstStyle/>
@@ -23117,7 +23122,7 @@
         </p:nvSpPr>
         <p:spPr>
           <a:xfrm>
-            <a:off x="3610237" y="3760724"/>
+            <a:off x="2334890" y="3424174"/>
             <a:ext cx="1152264" cy="673100"/>
           </a:xfrm>
           <a:prstGeom prst="flowChartMagneticDisk">
@@ -23269,7 +23274,7 @@
         </p:nvSpPr>
         <p:spPr>
           <a:xfrm>
-            <a:off x="5505450" y="1076242"/>
+            <a:off x="4363906" y="781834"/>
             <a:ext cx="1187450" cy="528784"/>
           </a:xfrm>
           <a:prstGeom prst="flowChartProcess">
@@ -23567,8 +23572,8 @@
           </a:p>
         </p:txBody>
       </p:sp>
-      <mc:AlternateContent xmlns:mc="http://schemas.openxmlformats.org/markup-compatibility/2006">
-        <mc:Choice xmlns:p14="http://schemas.microsoft.com/office/powerpoint/2010/main" Requires="p14">
+      <mc:AlternateContent xmlns:mc="http://schemas.openxmlformats.org/markup-compatibility/2006" xmlns:p14="http://schemas.microsoft.com/office/powerpoint/2010/main">
+        <mc:Choice Requires="p14">
           <p:contentPart p14:bwMode="auto" r:id="rId3">
             <p14:nvContentPartPr>
               <p14:cNvPr id="29" name="Ink 28">
@@ -23587,7 +23592,7 @@
             </p14:xfrm>
           </p:contentPart>
         </mc:Choice>
-        <mc:Fallback>
+        <mc:Fallback xmlns="">
           <p:pic>
             <p:nvPicPr>
               <p:cNvPr id="29" name="Ink 28">
@@ -23618,8 +23623,8 @@
           </p:pic>
         </mc:Fallback>
       </mc:AlternateContent>
-      <mc:AlternateContent xmlns:mc="http://schemas.openxmlformats.org/markup-compatibility/2006">
-        <mc:Choice xmlns:p14="http://schemas.microsoft.com/office/powerpoint/2010/main" Requires="p14">
+      <mc:AlternateContent xmlns:mc="http://schemas.openxmlformats.org/markup-compatibility/2006" xmlns:p14="http://schemas.microsoft.com/office/powerpoint/2010/main">
+        <mc:Choice Requires="p14">
           <p:contentPart p14:bwMode="auto" r:id="rId5">
             <p14:nvContentPartPr>
               <p14:cNvPr id="30" name="Ink 29">
@@ -23638,7 +23643,7 @@
             </p14:xfrm>
           </p:contentPart>
         </mc:Choice>
-        <mc:Fallback>
+        <mc:Fallback xmlns="">
           <p:pic>
             <p:nvPicPr>
               <p:cNvPr id="30" name="Ink 29">
@@ -23669,8 +23674,8 @@
           </p:pic>
         </mc:Fallback>
       </mc:AlternateContent>
-      <mc:AlternateContent xmlns:mc="http://schemas.openxmlformats.org/markup-compatibility/2006">
-        <mc:Choice xmlns:p14="http://schemas.microsoft.com/office/powerpoint/2010/main" Requires="p14">
+      <mc:AlternateContent xmlns:mc="http://schemas.openxmlformats.org/markup-compatibility/2006" xmlns:p14="http://schemas.microsoft.com/office/powerpoint/2010/main">
+        <mc:Choice Requires="p14">
           <p:contentPart p14:bwMode="auto" r:id="rId7">
             <p14:nvContentPartPr>
               <p14:cNvPr id="31" name="Ink 30">
@@ -23689,7 +23694,7 @@
             </p14:xfrm>
           </p:contentPart>
         </mc:Choice>
-        <mc:Fallback>
+        <mc:Fallback xmlns="">
           <p:pic>
             <p:nvPicPr>
               <p:cNvPr id="31" name="Ink 30">
@@ -23720,8 +23725,8 @@
           </p:pic>
         </mc:Fallback>
       </mc:AlternateContent>
-      <mc:AlternateContent xmlns:mc="http://schemas.openxmlformats.org/markup-compatibility/2006">
-        <mc:Choice xmlns:p14="http://schemas.microsoft.com/office/powerpoint/2010/main" Requires="p14">
+      <mc:AlternateContent xmlns:mc="http://schemas.openxmlformats.org/markup-compatibility/2006" xmlns:p14="http://schemas.microsoft.com/office/powerpoint/2010/main">
+        <mc:Choice Requires="p14">
           <p:contentPart p14:bwMode="auto" r:id="rId9">
             <p14:nvContentPartPr>
               <p14:cNvPr id="32" name="Ink 31">
@@ -23740,7 +23745,7 @@
             </p14:xfrm>
           </p:contentPart>
         </mc:Choice>
-        <mc:Fallback>
+        <mc:Fallback xmlns="">
           <p:pic>
             <p:nvPicPr>
               <p:cNvPr id="32" name="Ink 31">
@@ -23771,8 +23776,8 @@
           </p:pic>
         </mc:Fallback>
       </mc:AlternateContent>
-      <mc:AlternateContent xmlns:mc="http://schemas.openxmlformats.org/markup-compatibility/2006">
-        <mc:Choice xmlns:p14="http://schemas.microsoft.com/office/powerpoint/2010/main" Requires="p14">
+      <mc:AlternateContent xmlns:mc="http://schemas.openxmlformats.org/markup-compatibility/2006" xmlns:p14="http://schemas.microsoft.com/office/powerpoint/2010/main">
+        <mc:Choice Requires="p14">
           <p:contentPart p14:bwMode="auto" r:id="rId11">
             <p14:nvContentPartPr>
               <p14:cNvPr id="33" name="Ink 32">
@@ -23791,7 +23796,7 @@
             </p14:xfrm>
           </p:contentPart>
         </mc:Choice>
-        <mc:Fallback>
+        <mc:Fallback xmlns="">
           <p:pic>
             <p:nvPicPr>
               <p:cNvPr id="33" name="Ink 32">
@@ -23822,8 +23827,8 @@
           </p:pic>
         </mc:Fallback>
       </mc:AlternateContent>
-      <mc:AlternateContent xmlns:mc="http://schemas.openxmlformats.org/markup-compatibility/2006">
-        <mc:Choice xmlns:p14="http://schemas.microsoft.com/office/powerpoint/2010/main" Requires="p14">
+      <mc:AlternateContent xmlns:mc="http://schemas.openxmlformats.org/markup-compatibility/2006" xmlns:p14="http://schemas.microsoft.com/office/powerpoint/2010/main">
+        <mc:Choice Requires="p14">
           <p:contentPart p14:bwMode="auto" r:id="rId13">
             <p14:nvContentPartPr>
               <p14:cNvPr id="34" name="Ink 33">
@@ -23842,7 +23847,7 @@
             </p14:xfrm>
           </p:contentPart>
         </mc:Choice>
-        <mc:Fallback>
+        <mc:Fallback xmlns="">
           <p:pic>
             <p:nvPicPr>
               <p:cNvPr id="34" name="Ink 33">
@@ -23873,8 +23878,8 @@
           </p:pic>
         </mc:Fallback>
       </mc:AlternateContent>
-      <mc:AlternateContent xmlns:mc="http://schemas.openxmlformats.org/markup-compatibility/2006">
-        <mc:Choice xmlns:p14="http://schemas.microsoft.com/office/powerpoint/2010/main" Requires="p14">
+      <mc:AlternateContent xmlns:mc="http://schemas.openxmlformats.org/markup-compatibility/2006" xmlns:p14="http://schemas.microsoft.com/office/powerpoint/2010/main">
+        <mc:Choice Requires="p14">
           <p:contentPart p14:bwMode="auto" r:id="rId15">
             <p14:nvContentPartPr>
               <p14:cNvPr id="35" name="Ink 34">
@@ -23893,7 +23898,7 @@
             </p14:xfrm>
           </p:contentPart>
         </mc:Choice>
-        <mc:Fallback>
+        <mc:Fallback xmlns="">
           <p:pic>
             <p:nvPicPr>
               <p:cNvPr id="35" name="Ink 34">
@@ -23924,8 +23929,8 @@
           </p:pic>
         </mc:Fallback>
       </mc:AlternateContent>
-      <mc:AlternateContent xmlns:mc="http://schemas.openxmlformats.org/markup-compatibility/2006">
-        <mc:Choice xmlns:p14="http://schemas.microsoft.com/office/powerpoint/2010/main" Requires="p14">
+      <mc:AlternateContent xmlns:mc="http://schemas.openxmlformats.org/markup-compatibility/2006" xmlns:p14="http://schemas.microsoft.com/office/powerpoint/2010/main">
+        <mc:Choice Requires="p14">
           <p:contentPart p14:bwMode="auto" r:id="rId17">
             <p14:nvContentPartPr>
               <p14:cNvPr id="36" name="Ink 35">
@@ -23944,7 +23949,7 @@
             </p14:xfrm>
           </p:contentPart>
         </mc:Choice>
-        <mc:Fallback>
+        <mc:Fallback xmlns="">
           <p:pic>
             <p:nvPicPr>
               <p:cNvPr id="36" name="Ink 35">
@@ -23975,8 +23980,8 @@
           </p:pic>
         </mc:Fallback>
       </mc:AlternateContent>
-      <mc:AlternateContent xmlns:mc="http://schemas.openxmlformats.org/markup-compatibility/2006">
-        <mc:Choice xmlns:p14="http://schemas.microsoft.com/office/powerpoint/2010/main" Requires="p14">
+      <mc:AlternateContent xmlns:mc="http://schemas.openxmlformats.org/markup-compatibility/2006" xmlns:p14="http://schemas.microsoft.com/office/powerpoint/2010/main">
+        <mc:Choice Requires="p14">
           <p:contentPart p14:bwMode="auto" r:id="rId19">
             <p14:nvContentPartPr>
               <p14:cNvPr id="37" name="Ink 36">
@@ -23995,7 +24000,7 @@
             </p14:xfrm>
           </p:contentPart>
         </mc:Choice>
-        <mc:Fallback>
+        <mc:Fallback xmlns="">
           <p:pic>
             <p:nvPicPr>
               <p:cNvPr id="37" name="Ink 36">
@@ -24026,8 +24031,8 @@
           </p:pic>
         </mc:Fallback>
       </mc:AlternateContent>
-      <mc:AlternateContent xmlns:mc="http://schemas.openxmlformats.org/markup-compatibility/2006">
-        <mc:Choice xmlns:p14="http://schemas.microsoft.com/office/powerpoint/2010/main" Requires="p14">
+      <mc:AlternateContent xmlns:mc="http://schemas.openxmlformats.org/markup-compatibility/2006" xmlns:p14="http://schemas.microsoft.com/office/powerpoint/2010/main">
+        <mc:Choice Requires="p14">
           <p:contentPart p14:bwMode="auto" r:id="rId21">
             <p14:nvContentPartPr>
               <p14:cNvPr id="39" name="Ink 38">
@@ -24046,7 +24051,7 @@
             </p14:xfrm>
           </p:contentPart>
         </mc:Choice>
-        <mc:Fallback>
+        <mc:Fallback xmlns="">
           <p:pic>
             <p:nvPicPr>
               <p:cNvPr id="39" name="Ink 38">
@@ -24077,8 +24082,8 @@
           </p:pic>
         </mc:Fallback>
       </mc:AlternateContent>
-      <mc:AlternateContent xmlns:mc="http://schemas.openxmlformats.org/markup-compatibility/2006">
-        <mc:Choice xmlns:p14="http://schemas.microsoft.com/office/powerpoint/2010/main" Requires="p14">
+      <mc:AlternateContent xmlns:mc="http://schemas.openxmlformats.org/markup-compatibility/2006" xmlns:p14="http://schemas.microsoft.com/office/powerpoint/2010/main">
+        <mc:Choice Requires="p14">
           <p:contentPart p14:bwMode="auto" r:id="rId23">
             <p14:nvContentPartPr>
               <p14:cNvPr id="40" name="Ink 39">
@@ -24097,7 +24102,7 @@
             </p14:xfrm>
           </p:contentPart>
         </mc:Choice>
-        <mc:Fallback>
+        <mc:Fallback xmlns="">
           <p:pic>
             <p:nvPicPr>
               <p:cNvPr id="40" name="Ink 39">

</xml_diff>